<commit_message>
improve slide 3 of slides-115-BRSKI-AE.pptx
</commit_message>
<xml_diff>
--- a/presentations/slides-115-BRSKI-AE.pptx
+++ b/presentations/slides-115-BRSKI-AE.pptx
@@ -65,31 +65,7 @@
               <a:rPr b="0" lang="en-US" sz="4400" spc="-1" strike="noStrike">
                 <a:latin typeface="Arial"/>
               </a:rPr>
-              <a:t>Click </a:t>
-            </a:r>
-            <a:r>
-              <a:rPr b="0" lang="en-US" sz="4400" spc="-1" strike="noStrike">
-                <a:latin typeface="Arial"/>
-              </a:rPr>
-              <a:t>to </a:t>
-            </a:r>
-            <a:r>
-              <a:rPr b="0" lang="en-US" sz="4400" spc="-1" strike="noStrike">
-                <a:latin typeface="Arial"/>
-              </a:rPr>
-              <a:t>mov</a:t>
-            </a:r>
-            <a:r>
-              <a:rPr b="0" lang="en-US" sz="4400" spc="-1" strike="noStrike">
-                <a:latin typeface="Arial"/>
-              </a:rPr>
-              <a:t>e the </a:t>
-            </a:r>
-            <a:r>
-              <a:rPr b="0" lang="en-US" sz="4400" spc="-1" strike="noStrike">
-                <a:latin typeface="Arial"/>
-              </a:rPr>
-              <a:t>slide</a:t>
+              <a:t>Click to move the slide</a:t>
             </a:r>
             <a:endParaRPr b="0" lang="en-US" sz="4400" spc="-1" strike="noStrike">
               <a:latin typeface="Arial"/>
@@ -125,49 +101,7 @@
               <a:rPr b="0" lang="en-US" sz="2000" spc="-1" strike="noStrike">
                 <a:latin typeface="Arial"/>
               </a:rPr>
-              <a:t>Click </a:t>
-            </a:r>
-            <a:r>
-              <a:rPr b="0" lang="en-US" sz="2000" spc="-1" strike="noStrike">
-                <a:latin typeface="Arial"/>
-              </a:rPr>
-              <a:t>to </a:t>
-            </a:r>
-            <a:r>
-              <a:rPr b="0" lang="en-US" sz="2000" spc="-1" strike="noStrike">
-                <a:latin typeface="Arial"/>
-              </a:rPr>
-              <a:t>edit </a:t>
-            </a:r>
-            <a:r>
-              <a:rPr b="0" lang="en-US" sz="2000" spc="-1" strike="noStrike">
-                <a:latin typeface="Arial"/>
-              </a:rPr>
-              <a:t>the </a:t>
-            </a:r>
-            <a:r>
-              <a:rPr b="0" lang="en-US" sz="2000" spc="-1" strike="noStrike">
-                <a:latin typeface="Arial"/>
-              </a:rPr>
-              <a:t>note</a:t>
-            </a:r>
-            <a:r>
-              <a:rPr b="0" lang="en-US" sz="2000" spc="-1" strike="noStrike">
-                <a:latin typeface="Arial"/>
-              </a:rPr>
-              <a:t>s </a:t>
-            </a:r>
-            <a:r>
-              <a:rPr b="0" lang="en-US" sz="2000" spc="-1" strike="noStrike">
-                <a:latin typeface="Arial"/>
-              </a:rPr>
-              <a:t>form</a:t>
-            </a:r>
-            <a:r>
-              <a:rPr b="0" lang="en-US" sz="2000" spc="-1" strike="noStrike">
-                <a:latin typeface="Arial"/>
-              </a:rPr>
-              <a:t>at</a:t>
+              <a:t>Click to edit the notes format</a:t>
             </a:r>
             <a:endParaRPr b="0" lang="en-US" sz="2000" spc="-1" strike="noStrike">
               <a:latin typeface="Arial"/>
@@ -309,7 +243,7 @@
           </a:bodyPr>
           <a:p>
             <a:pPr algn="r"/>
-            <a:fld id="{9CE6CB3B-1223-4130-AAFD-D197F82ED615}" type="slidenum">
+            <a:fld id="{D2F379C4-D5A4-47E3-AB24-A1ED4A5E67D7}" type="slidenum">
               <a:rPr b="0" lang="en-US" sz="1400" spc="-1" strike="noStrike">
                 <a:latin typeface="Times New Roman"/>
               </a:rPr>
@@ -357,7 +291,7 @@
         <p:spPr>
           <a:xfrm>
             <a:off x="685800" y="1143000"/>
-            <a:ext cx="5484240" cy="3083760"/>
+            <a:ext cx="5483520" cy="3083040"/>
           </a:xfrm>
           <a:prstGeom prst="rect">
             <a:avLst/>
@@ -377,7 +311,7 @@
         <p:spPr>
           <a:xfrm>
             <a:off x="685800" y="4400640"/>
-            <a:ext cx="5483880" cy="3597840"/>
+            <a:ext cx="5483160" cy="3597120"/>
           </a:xfrm>
           <a:prstGeom prst="rect">
             <a:avLst/>
@@ -403,7 +337,7 @@
         <p:spPr>
           <a:xfrm>
             <a:off x="3884760" y="8685360"/>
-            <a:ext cx="2969280" cy="456120"/>
+            <a:ext cx="2968560" cy="455400"/>
           </a:xfrm>
           <a:prstGeom prst="rect">
             <a:avLst/>
@@ -429,7 +363,7 @@
                 <a:spcPct val="100000"/>
               </a:lnSpc>
             </a:pPr>
-            <a:fld id="{8B8FAE65-D097-4441-8DC8-4D69B57900A4}" type="slidenum">
+            <a:fld id="{523E0EE8-1EB2-4AB8-A5B8-71CE3610D231}" type="slidenum">
               <a:rPr b="0" lang="en-US" sz="1200" spc="-1" strike="noStrike">
                 <a:solidFill>
                   <a:srgbClr val="000000"/>
@@ -437,7 +371,7 @@
                 <a:latin typeface="Times New Roman"/>
                 <a:ea typeface="+mn-ea"/>
               </a:rPr>
-              <a:t>4</a:t>
+              <a:t>&lt;number&gt;</a:t>
             </a:fld>
             <a:endParaRPr b="0" lang="en-US" sz="1200" spc="-1" strike="noStrike">
               <a:latin typeface="Arial"/>
@@ -500,7 +434,7 @@
         <p:spPr>
           <a:xfrm>
             <a:off x="685800" y="4400640"/>
-            <a:ext cx="5483880" cy="3597840"/>
+            <a:ext cx="5483160" cy="3597120"/>
           </a:xfrm>
           <a:prstGeom prst="rect">
             <a:avLst/>
@@ -526,7 +460,7 @@
         <p:spPr>
           <a:xfrm>
             <a:off x="3884760" y="8685360"/>
-            <a:ext cx="2969280" cy="456120"/>
+            <a:ext cx="2968560" cy="455400"/>
           </a:xfrm>
           <a:prstGeom prst="rect">
             <a:avLst/>
@@ -552,7 +486,7 @@
                 <a:spcPct val="100000"/>
               </a:lnSpc>
             </a:pPr>
-            <a:fld id="{35F34738-6582-4CB7-A166-CF5CB4BD8F3E}" type="slidenum">
+            <a:fld id="{D27090B8-8D03-406A-B58C-E13D3C08CEEA}" type="slidenum">
               <a:rPr b="0" lang="en-US" sz="1200" spc="-1" strike="noStrike">
                 <a:solidFill>
                   <a:srgbClr val="000000"/>
@@ -560,7 +494,7 @@
                 <a:latin typeface="Times New Roman"/>
                 <a:ea typeface="+mn-ea"/>
               </a:rPr>
-              <a:t>4</a:t>
+              <a:t>&lt;number&gt;</a:t>
             </a:fld>
             <a:endParaRPr b="0" lang="en-US" sz="1200" spc="-1" strike="noStrike">
               <a:latin typeface="Arial"/>
@@ -603,7 +537,7 @@
         <p:spPr>
           <a:xfrm>
             <a:off x="685800" y="1143000"/>
-            <a:ext cx="5484240" cy="3083760"/>
+            <a:ext cx="5483520" cy="3083040"/>
           </a:xfrm>
           <a:prstGeom prst="rect">
             <a:avLst/>
@@ -623,7 +557,7 @@
         <p:spPr>
           <a:xfrm>
             <a:off x="685800" y="4400640"/>
-            <a:ext cx="5483880" cy="3597840"/>
+            <a:ext cx="5483160" cy="3597120"/>
           </a:xfrm>
           <a:prstGeom prst="rect">
             <a:avLst/>
@@ -649,7 +583,7 @@
         <p:spPr>
           <a:xfrm>
             <a:off x="3884760" y="8685360"/>
-            <a:ext cx="2969280" cy="456120"/>
+            <a:ext cx="2968560" cy="455400"/>
           </a:xfrm>
           <a:prstGeom prst="rect">
             <a:avLst/>
@@ -675,7 +609,7 @@
                 <a:spcPct val="100000"/>
               </a:lnSpc>
             </a:pPr>
-            <a:fld id="{F0761CCF-967C-47B0-82F4-2F27E5C16051}" type="slidenum">
+            <a:fld id="{1CDFD9F0-23B5-41AE-9FDB-CDE85CCF0DFC}" type="slidenum">
               <a:rPr b="0" lang="en-US" sz="1200" spc="-1" strike="noStrike">
                 <a:solidFill>
                   <a:srgbClr val="000000"/>
@@ -683,7 +617,7 @@
                 <a:latin typeface="Times New Roman"/>
                 <a:ea typeface="+mn-ea"/>
               </a:rPr>
-              <a:t>4</a:t>
+              <a:t>&lt;number&gt;</a:t>
             </a:fld>
             <a:endParaRPr b="0" lang="en-US" sz="1200" spc="-1" strike="noStrike">
               <a:latin typeface="Arial"/>
@@ -3701,7 +3635,7 @@
         <p:spPr>
           <a:xfrm>
             <a:off x="7218720" y="6472800"/>
-            <a:ext cx="2031840" cy="362520"/>
+            <a:ext cx="2031120" cy="361800"/>
           </a:xfrm>
           <a:prstGeom prst="rect">
             <a:avLst/>
@@ -3752,7 +3686,7 @@
         <p:spPr>
           <a:xfrm>
             <a:off x="4032000" y="6472800"/>
-            <a:ext cx="1294560" cy="362520"/>
+            <a:ext cx="1293840" cy="361800"/>
           </a:xfrm>
           <a:prstGeom prst="rect">
             <a:avLst/>
@@ -3803,7 +3737,7 @@
         <p:spPr>
           <a:xfrm>
             <a:off x="846720" y="6508800"/>
-            <a:ext cx="1264680" cy="362520"/>
+            <a:ext cx="1263960" cy="361800"/>
           </a:xfrm>
           <a:prstGeom prst="rect">
             <a:avLst/>
@@ -3864,7 +3798,7 @@
         <p:spPr>
           <a:xfrm>
             <a:off x="11016000" y="6472800"/>
-            <a:ext cx="898560" cy="362520"/>
+            <a:ext cx="897840" cy="361800"/>
           </a:xfrm>
           <a:prstGeom prst="rect">
             <a:avLst/>
@@ -3890,7 +3824,7 @@
                 <a:spcPct val="100000"/>
               </a:lnSpc>
             </a:pPr>
-            <a:fld id="{F0C28336-A4F9-4F22-BED7-C54CE856BC6C}" type="slidenum">
+            <a:fld id="{87557314-DB74-47DF-A5E3-CD548DDF49EE}" type="slidenum">
               <a:rPr b="0" lang="en-US" sz="1200" spc="-1" strike="noStrike">
                 <a:solidFill>
                   <a:srgbClr val="8b8b8b"/>
@@ -3935,49 +3869,7 @@
               <a:rPr b="0" lang="en-US" sz="4400" spc="-1" strike="noStrike">
                 <a:latin typeface="Arial"/>
               </a:rPr>
-              <a:t>Clic</a:t>
-            </a:r>
-            <a:r>
-              <a:rPr b="0" lang="en-US" sz="4400" spc="-1" strike="noStrike">
-                <a:latin typeface="Arial"/>
-              </a:rPr>
-              <a:t>k to </a:t>
-            </a:r>
-            <a:r>
-              <a:rPr b="0" lang="en-US" sz="4400" spc="-1" strike="noStrike">
-                <a:latin typeface="Arial"/>
-              </a:rPr>
-              <a:t>edit </a:t>
-            </a:r>
-            <a:r>
-              <a:rPr b="0" lang="en-US" sz="4400" spc="-1" strike="noStrike">
-                <a:latin typeface="Arial"/>
-              </a:rPr>
-              <a:t>the </a:t>
-            </a:r>
-            <a:r>
-              <a:rPr b="0" lang="en-US" sz="4400" spc="-1" strike="noStrike">
-                <a:latin typeface="Arial"/>
-              </a:rPr>
-              <a:t>title </a:t>
-            </a:r>
-            <a:r>
-              <a:rPr b="0" lang="en-US" sz="4400" spc="-1" strike="noStrike">
-                <a:latin typeface="Arial"/>
-              </a:rPr>
-              <a:t>text </a:t>
-            </a:r>
-            <a:r>
-              <a:rPr b="0" lang="en-US" sz="4400" spc="-1" strike="noStrike">
-                <a:latin typeface="Arial"/>
-              </a:rPr>
-              <a:t>for</a:t>
-            </a:r>
-            <a:r>
-              <a:rPr b="0" lang="en-US" sz="4400" spc="-1" strike="noStrike">
-                <a:latin typeface="Arial"/>
-              </a:rPr>
-              <a:t>mat</a:t>
+              <a:t>Click to edit the title text format</a:t>
             </a:r>
             <a:endParaRPr b="0" lang="en-US" sz="4400" spc="-1" strike="noStrike">
               <a:latin typeface="Arial"/>
@@ -4210,7 +4102,7 @@
         <p:spPr>
           <a:xfrm>
             <a:off x="219960" y="770760"/>
-            <a:ext cx="11681640" cy="1586520"/>
+            <a:ext cx="11680920" cy="1585800"/>
           </a:xfrm>
           <a:prstGeom prst="rect">
             <a:avLst/>
@@ -4272,7 +4164,7 @@
         <p:spPr>
           <a:xfrm>
             <a:off x="432720" y="2359800"/>
-            <a:ext cx="11468880" cy="4156560"/>
+            <a:ext cx="11468160" cy="4155840"/>
           </a:xfrm>
           <a:prstGeom prst="rect">
             <a:avLst/>
@@ -4574,7 +4466,7 @@
         <p:spPr>
           <a:xfrm>
             <a:off x="5146560" y="1250640"/>
-            <a:ext cx="2504880" cy="5265000"/>
+            <a:ext cx="2504160" cy="5264280"/>
           </a:xfrm>
           <a:prstGeom prst="rect">
             <a:avLst/>
@@ -4604,7 +4496,7 @@
         <p:spPr>
           <a:xfrm>
             <a:off x="7702560" y="1358640"/>
-            <a:ext cx="1553040" cy="5157000"/>
+            <a:ext cx="1552320" cy="5156280"/>
           </a:xfrm>
           <a:prstGeom prst="rect">
             <a:avLst/>
@@ -4634,7 +4526,7 @@
         <p:spPr>
           <a:xfrm>
             <a:off x="9288000" y="1250640"/>
-            <a:ext cx="1658160" cy="5265000"/>
+            <a:ext cx="1657440" cy="5264280"/>
           </a:xfrm>
           <a:prstGeom prst="rect">
             <a:avLst/>
@@ -4664,7 +4556,7 @@
         <p:spPr>
           <a:xfrm>
             <a:off x="2383560" y="1259640"/>
-            <a:ext cx="2715480" cy="5256000"/>
+            <a:ext cx="2714760" cy="5255280"/>
           </a:xfrm>
           <a:prstGeom prst="rect">
             <a:avLst/>
@@ -4694,7 +4586,7 @@
         <p:spPr>
           <a:xfrm>
             <a:off x="2357640" y="2025000"/>
-            <a:ext cx="2775600" cy="1325160"/>
+            <a:ext cx="2774880" cy="1324440"/>
           </a:xfrm>
           <a:prstGeom prst="rect">
             <a:avLst/>
@@ -4730,7 +4622,7 @@
         <p:spPr>
           <a:xfrm>
             <a:off x="2729880" y="1853280"/>
-            <a:ext cx="2099880" cy="326880"/>
+            <a:ext cx="2099160" cy="326160"/>
           </a:xfrm>
           <a:prstGeom prst="rect">
             <a:avLst/>
@@ -4785,7 +4677,7 @@
         <p:spPr>
           <a:xfrm>
             <a:off x="2729880" y="3283560"/>
-            <a:ext cx="2099880" cy="180000"/>
+            <a:ext cx="2099160" cy="179280"/>
           </a:xfrm>
           <a:prstGeom prst="rect">
             <a:avLst/>
@@ -4840,7 +4732,7 @@
         <p:spPr>
           <a:xfrm>
             <a:off x="2592000" y="2448000"/>
-            <a:ext cx="2527560" cy="360"/>
+            <a:ext cx="2526840" cy="360"/>
           </a:xfrm>
           <a:custGeom>
             <a:avLst/>
@@ -4883,7 +4775,7 @@
         <p:spPr>
           <a:xfrm>
             <a:off x="2558520" y="2262240"/>
-            <a:ext cx="2561040" cy="211320"/>
+            <a:ext cx="2560320" cy="211320"/>
           </a:xfrm>
           <a:prstGeom prst="rect">
             <a:avLst/>
@@ -4933,8 +4825,8 @@
         </p:nvSpPr>
         <p:spPr>
           <a:xfrm flipH="1">
-            <a:off x="2621160" y="3246840"/>
-            <a:ext cx="2496240" cy="360"/>
+            <a:off x="2620440" y="3246840"/>
+            <a:ext cx="2495520" cy="360"/>
           </a:xfrm>
           <a:custGeom>
             <a:avLst/>
@@ -4977,7 +4869,7 @@
         <p:spPr>
           <a:xfrm>
             <a:off x="5712120" y="1691640"/>
-            <a:ext cx="1819800" cy="576360"/>
+            <a:ext cx="1819080" cy="576360"/>
           </a:xfrm>
           <a:prstGeom prst="rect">
             <a:avLst/>
@@ -4998,7 +4890,7 @@
             <a:spAutoFit/>
           </a:bodyPr>
           <a:p>
-            <a:pPr marL="84960" indent="-82440">
+            <a:pPr marL="84960" indent="-81720">
               <a:lnSpc>
                 <a:spcPct val="100000"/>
               </a:lnSpc>
@@ -5023,7 +4915,7 @@
             </a:endParaRPr>
           </a:p>
           <a:p>
-            <a:pPr marL="84960" indent="-82440">
+            <a:pPr marL="84960" indent="-81720">
               <a:lnSpc>
                 <a:spcPct val="100000"/>
               </a:lnSpc>
@@ -5057,8 +4949,8 @@
         </p:nvSpPr>
         <p:spPr>
           <a:xfrm flipV="1">
-            <a:off x="5940360" y="2597400"/>
-            <a:ext cx="5082480" cy="5400"/>
+            <a:off x="5940360" y="2595960"/>
+            <a:ext cx="5081760" cy="4680"/>
           </a:xfrm>
           <a:custGeom>
             <a:avLst/>
@@ -5101,7 +4993,7 @@
         <p:spPr>
           <a:xfrm>
             <a:off x="6806880" y="2432880"/>
-            <a:ext cx="3069360" cy="211320"/>
+            <a:ext cx="3068640" cy="211320"/>
           </a:xfrm>
           <a:prstGeom prst="rect">
             <a:avLst/>
@@ -5151,8 +5043,8 @@
         </p:nvSpPr>
         <p:spPr>
           <a:xfrm rot="16200000">
-            <a:off x="10530720" y="2016000"/>
-            <a:ext cx="1796400" cy="698040"/>
+            <a:off x="10531080" y="2016360"/>
+            <a:ext cx="1795680" cy="698040"/>
           </a:xfrm>
           <a:prstGeom prst="rect">
             <a:avLst/>
@@ -5173,7 +5065,7 @@
             <a:spAutoFit/>
           </a:bodyPr>
           <a:p>
-            <a:pPr marL="84960" indent="-82440">
+            <a:pPr marL="84960" indent="-81720">
               <a:lnSpc>
                 <a:spcPct val="100000"/>
               </a:lnSpc>
@@ -5198,7 +5090,7 @@
             </a:endParaRPr>
           </a:p>
           <a:p>
-            <a:pPr marL="84960" indent="-82440">
+            <a:pPr marL="84960" indent="-81720">
               <a:lnSpc>
                 <a:spcPct val="100000"/>
               </a:lnSpc>
@@ -5223,7 +5115,7 @@
             </a:endParaRPr>
           </a:p>
           <a:p>
-            <a:pPr marL="84960" indent="-82440">
+            <a:pPr marL="84960" indent="-81720">
               <a:lnSpc>
                 <a:spcPct val="100000"/>
               </a:lnSpc>
@@ -5257,8 +5149,8 @@
         </p:nvSpPr>
         <p:spPr>
           <a:xfrm flipH="1" flipV="1">
-            <a:off x="5152320" y="3144960"/>
-            <a:ext cx="5843160" cy="360"/>
+            <a:off x="5151600" y="3143520"/>
+            <a:ext cx="5842440" cy="360"/>
           </a:xfrm>
           <a:custGeom>
             <a:avLst/>
@@ -5352,7 +5244,7 @@
         <p:spPr>
           <a:xfrm>
             <a:off x="2517840" y="3070080"/>
-            <a:ext cx="2514960" cy="211320"/>
+            <a:ext cx="2514240" cy="211320"/>
           </a:xfrm>
           <a:prstGeom prst="rect">
             <a:avLst/>
@@ -5403,7 +5295,7 @@
         <p:spPr>
           <a:xfrm>
             <a:off x="1809360" y="1009800"/>
-            <a:ext cx="911520" cy="530640"/>
+            <a:ext cx="910800" cy="529920"/>
           </a:xfrm>
           <a:prstGeom prst="rect">
             <a:avLst/>
@@ -5459,7 +5351,7 @@
         <p:spPr>
           <a:xfrm>
             <a:off x="3960000" y="1009800"/>
-            <a:ext cx="1879920" cy="524880"/>
+            <a:ext cx="1879200" cy="524160"/>
           </a:xfrm>
           <a:prstGeom prst="rect">
             <a:avLst/>
@@ -5556,7 +5448,7 @@
         <p:spPr>
           <a:xfrm>
             <a:off x="8951760" y="1009800"/>
-            <a:ext cx="606600" cy="546840"/>
+            <a:ext cx="605880" cy="546120"/>
           </a:xfrm>
           <a:prstGeom prst="rect">
             <a:avLst/>
@@ -5623,7 +5515,7 @@
         <p:spPr>
           <a:xfrm>
             <a:off x="10569600" y="1009800"/>
-            <a:ext cx="911520" cy="530640"/>
+            <a:ext cx="910800" cy="529920"/>
           </a:xfrm>
           <a:prstGeom prst="rect">
             <a:avLst/>
@@ -5679,7 +5571,7 @@
         <p:spPr>
           <a:xfrm>
             <a:off x="2538000" y="4926240"/>
-            <a:ext cx="1959840" cy="333000"/>
+            <a:ext cx="1959120" cy="333000"/>
           </a:xfrm>
           <a:prstGeom prst="rect">
             <a:avLst/>
@@ -5741,7 +5633,7 @@
         <p:spPr>
           <a:xfrm>
             <a:off x="2385360" y="5241960"/>
-            <a:ext cx="2722680" cy="360"/>
+            <a:ext cx="2721960" cy="360"/>
           </a:xfrm>
           <a:custGeom>
             <a:avLst/>
@@ -5839,8 +5731,8 @@
         </p:nvSpPr>
         <p:spPr>
           <a:xfrm flipH="1">
-            <a:off x="2381400" y="4271400"/>
-            <a:ext cx="2724480" cy="360"/>
+            <a:off x="2380680" y="4271400"/>
+            <a:ext cx="2723760" cy="360"/>
           </a:xfrm>
           <a:custGeom>
             <a:avLst/>
@@ -5883,7 +5775,7 @@
         <p:spPr>
           <a:xfrm>
             <a:off x="2473560" y="5341680"/>
-            <a:ext cx="2561040" cy="211320"/>
+            <a:ext cx="2560320" cy="211320"/>
           </a:xfrm>
           <a:prstGeom prst="rect">
             <a:avLst/>
@@ -5934,7 +5826,7 @@
         <p:spPr>
           <a:xfrm>
             <a:off x="2732400" y="1035360"/>
-            <a:ext cx="1046160" cy="454680"/>
+            <a:ext cx="1045440" cy="454680"/>
           </a:xfrm>
           <a:prstGeom prst="rect">
             <a:avLst/>
@@ -5955,7 +5847,7 @@
             <a:spAutoFit/>
           </a:bodyPr>
           <a:p>
-            <a:pPr marL="85680" indent="-83160">
+            <a:pPr marL="85680" indent="-82440">
               <a:lnSpc>
                 <a:spcPct val="100000"/>
               </a:lnSpc>
@@ -5980,7 +5872,7 @@
             </a:endParaRPr>
           </a:p>
           <a:p>
-            <a:pPr marL="85680" indent="-83160">
+            <a:pPr marL="85680" indent="-82440">
               <a:lnSpc>
                 <a:spcPct val="100000"/>
               </a:lnSpc>
@@ -6015,7 +5907,7 @@
         <p:spPr>
           <a:xfrm>
             <a:off x="5805360" y="1075320"/>
-            <a:ext cx="1567440" cy="454680"/>
+            <a:ext cx="1566720" cy="454680"/>
           </a:xfrm>
           <a:prstGeom prst="rect">
             <a:avLst/>
@@ -6036,7 +5928,7 @@
             <a:spAutoFit/>
           </a:bodyPr>
           <a:p>
-            <a:pPr marL="84960" indent="-82440">
+            <a:pPr marL="84960" indent="-81720">
               <a:lnSpc>
                 <a:spcPct val="100000"/>
               </a:lnSpc>
@@ -6061,7 +5953,7 @@
             </a:endParaRPr>
           </a:p>
           <a:p>
-            <a:pPr marL="84960" indent="-82440">
+            <a:pPr marL="84960" indent="-81720">
               <a:lnSpc>
                 <a:spcPct val="100000"/>
               </a:lnSpc>
@@ -6086,7 +5978,7 @@
             </a:endParaRPr>
           </a:p>
           <a:p>
-            <a:pPr marL="84960" indent="-82440">
+            <a:pPr marL="84960" indent="-81720">
               <a:lnSpc>
                 <a:spcPct val="100000"/>
               </a:lnSpc>
@@ -6121,7 +6013,7 @@
         <p:spPr>
           <a:xfrm>
             <a:off x="9524160" y="1075320"/>
-            <a:ext cx="1007640" cy="333000"/>
+            <a:ext cx="1006920" cy="333000"/>
           </a:xfrm>
           <a:prstGeom prst="rect">
             <a:avLst/>
@@ -6142,7 +6034,7 @@
             <a:spAutoFit/>
           </a:bodyPr>
           <a:p>
-            <a:pPr marL="84960" indent="-82440">
+            <a:pPr marL="84960" indent="-81720">
               <a:lnSpc>
                 <a:spcPct val="100000"/>
               </a:lnSpc>
@@ -6177,7 +6069,7 @@
         <p:spPr>
           <a:xfrm>
             <a:off x="10223640" y="1611360"/>
-            <a:ext cx="975600" cy="333000"/>
+            <a:ext cx="974880" cy="333000"/>
           </a:xfrm>
           <a:prstGeom prst="rect">
             <a:avLst/>
@@ -6198,7 +6090,7 @@
             <a:spAutoFit/>
           </a:bodyPr>
           <a:p>
-            <a:pPr marL="84960" indent="-82440">
+            <a:pPr marL="84960" indent="-81720">
               <a:lnSpc>
                 <a:spcPct val="100000"/>
               </a:lnSpc>
@@ -6237,7 +6129,7 @@
         <p:spPr>
           <a:xfrm>
             <a:off x="10533240" y="2893320"/>
-            <a:ext cx="283320" cy="593280"/>
+            <a:ext cx="282600" cy="592560"/>
           </a:xfrm>
           <a:prstGeom prst="rect">
             <a:avLst/>
@@ -6284,7 +6176,7 @@
         <p:spPr>
           <a:xfrm>
             <a:off x="529200" y="2063880"/>
-            <a:ext cx="730800" cy="1063080"/>
+            <a:ext cx="730080" cy="1063080"/>
           </a:xfrm>
           <a:prstGeom prst="rect">
             <a:avLst/>
@@ -6350,7 +6242,7 @@
         <p:spPr>
           <a:xfrm>
             <a:off x="676800" y="3946320"/>
-            <a:ext cx="1265040" cy="819720"/>
+            <a:ext cx="1264320" cy="819720"/>
           </a:xfrm>
           <a:prstGeom prst="rect">
             <a:avLst/>
@@ -6420,7 +6312,7 @@
         <p:spPr>
           <a:xfrm>
             <a:off x="2288160" y="2983680"/>
-            <a:ext cx="283320" cy="593280"/>
+            <a:ext cx="282600" cy="592560"/>
           </a:xfrm>
           <a:prstGeom prst="rect">
             <a:avLst/>
@@ -6443,7 +6335,7 @@
         <p:spPr>
           <a:xfrm>
             <a:off x="1882800" y="1840680"/>
-            <a:ext cx="691920" cy="699480"/>
+            <a:ext cx="691200" cy="698760"/>
           </a:xfrm>
           <a:prstGeom prst="rect">
             <a:avLst/>
@@ -6466,7 +6358,7 @@
         <p:spPr>
           <a:xfrm>
             <a:off x="5208840" y="2260080"/>
-            <a:ext cx="788760" cy="758520"/>
+            <a:ext cx="788040" cy="757800"/>
           </a:xfrm>
           <a:prstGeom prst="rect">
             <a:avLst/>
@@ -6485,7 +6377,7 @@
         <p:spPr>
           <a:xfrm>
             <a:off x="2402280" y="3873240"/>
-            <a:ext cx="2561040" cy="211320"/>
+            <a:ext cx="2560320" cy="211320"/>
           </a:xfrm>
           <a:prstGeom prst="rect">
             <a:avLst/>
@@ -6536,7 +6428,7 @@
         <p:spPr>
           <a:xfrm>
             <a:off x="2385360" y="4050000"/>
-            <a:ext cx="2722680" cy="360"/>
+            <a:ext cx="2721960" cy="360"/>
           </a:xfrm>
           <a:custGeom>
             <a:avLst/>
@@ -6579,7 +6471,7 @@
         <p:spPr>
           <a:xfrm>
             <a:off x="2402280" y="4084920"/>
-            <a:ext cx="2561040" cy="211320"/>
+            <a:ext cx="2560320" cy="211320"/>
           </a:xfrm>
           <a:prstGeom prst="rect">
             <a:avLst/>
@@ -6629,8 +6521,8 @@
         </p:nvSpPr>
         <p:spPr>
           <a:xfrm flipH="1">
-            <a:off x="2381400" y="5545800"/>
-            <a:ext cx="2724480" cy="360"/>
+            <a:off x="2380680" y="5545800"/>
+            <a:ext cx="2723760" cy="360"/>
           </a:xfrm>
           <a:custGeom>
             <a:avLst/>
@@ -6672,8 +6564,8 @@
         </p:nvSpPr>
         <p:spPr>
           <a:xfrm flipH="1">
-            <a:off x="2381400" y="4771440"/>
-            <a:ext cx="2724480" cy="360"/>
+            <a:off x="2380680" y="4771440"/>
+            <a:ext cx="2723760" cy="360"/>
           </a:xfrm>
           <a:custGeom>
             <a:avLst/>
@@ -6716,7 +6608,7 @@
         <p:spPr>
           <a:xfrm>
             <a:off x="2402280" y="4373280"/>
-            <a:ext cx="2561040" cy="211320"/>
+            <a:ext cx="2560320" cy="211320"/>
           </a:xfrm>
           <a:prstGeom prst="rect">
             <a:avLst/>
@@ -6767,7 +6659,7 @@
         <p:spPr>
           <a:xfrm>
             <a:off x="2385360" y="4550040"/>
-            <a:ext cx="2722680" cy="360"/>
+            <a:ext cx="2721960" cy="360"/>
           </a:xfrm>
           <a:custGeom>
             <a:avLst/>
@@ -6810,7 +6702,7 @@
         <p:spPr>
           <a:xfrm>
             <a:off x="2402280" y="4584960"/>
-            <a:ext cx="2561040" cy="211320"/>
+            <a:ext cx="2560320" cy="211320"/>
           </a:xfrm>
           <a:prstGeom prst="rect">
             <a:avLst/>
@@ -6865,7 +6757,7 @@
         <p:spPr>
           <a:xfrm>
             <a:off x="2015280" y="4876560"/>
-            <a:ext cx="483840" cy="525960"/>
+            <a:ext cx="483120" cy="525240"/>
           </a:xfrm>
           <a:prstGeom prst="rect">
             <a:avLst/>
@@ -6884,7 +6776,7 @@
         <p:spPr>
           <a:xfrm>
             <a:off x="2032920" y="5424480"/>
-            <a:ext cx="322200" cy="237600"/>
+            <a:ext cx="321480" cy="236880"/>
           </a:xfrm>
           <a:prstGeom prst="rect">
             <a:avLst/>
@@ -6919,7 +6811,7 @@
         <p:spPr>
           <a:xfrm>
             <a:off x="2032920" y="5385240"/>
-            <a:ext cx="307800" cy="307800"/>
+            <a:ext cx="307080" cy="307080"/>
           </a:xfrm>
           <a:prstGeom prst="rect">
             <a:avLst/>
@@ -6942,7 +6834,7 @@
         <p:spPr>
           <a:xfrm>
             <a:off x="9304560" y="5387400"/>
-            <a:ext cx="307800" cy="307800"/>
+            <a:ext cx="307080" cy="307080"/>
           </a:xfrm>
           <a:prstGeom prst="rect">
             <a:avLst/>
@@ -6961,7 +6853,7 @@
         <p:spPr>
           <a:xfrm>
             <a:off x="1009080" y="5512320"/>
-            <a:ext cx="1038240" cy="333000"/>
+            <a:ext cx="1037520" cy="333000"/>
           </a:xfrm>
           <a:prstGeom prst="rect">
             <a:avLst/>
@@ -7012,7 +6904,7 @@
         <p:spPr>
           <a:xfrm>
             <a:off x="6660000" y="4910400"/>
-            <a:ext cx="1941840" cy="333000"/>
+            <a:ext cx="1941120" cy="333000"/>
           </a:xfrm>
           <a:prstGeom prst="rect">
             <a:avLst/>
@@ -7063,7 +6955,7 @@
         <p:spPr>
           <a:xfrm>
             <a:off x="2385360" y="3603960"/>
-            <a:ext cx="2713680" cy="360"/>
+            <a:ext cx="2712960" cy="360"/>
           </a:xfrm>
           <a:custGeom>
             <a:avLst/>
@@ -7106,7 +6998,7 @@
         <p:spPr>
           <a:xfrm>
             <a:off x="3033720" y="3421440"/>
-            <a:ext cx="1399680" cy="211320"/>
+            <a:ext cx="1398960" cy="211320"/>
           </a:xfrm>
           <a:prstGeom prst="rect">
             <a:avLst/>
@@ -7157,7 +7049,7 @@
         <p:spPr>
           <a:xfrm>
             <a:off x="2385360" y="6390720"/>
-            <a:ext cx="2713680" cy="360"/>
+            <a:ext cx="2712960" cy="360"/>
           </a:xfrm>
           <a:custGeom>
             <a:avLst/>
@@ -7200,7 +7092,7 @@
         <p:spPr>
           <a:xfrm>
             <a:off x="3033720" y="6172200"/>
-            <a:ext cx="1399680" cy="211320"/>
+            <a:ext cx="1398960" cy="211320"/>
           </a:xfrm>
           <a:prstGeom prst="rect">
             <a:avLst/>
@@ -7251,7 +7143,7 @@
         <p:spPr>
           <a:xfrm>
             <a:off x="7363440" y="1009800"/>
-            <a:ext cx="590400" cy="546840"/>
+            <a:ext cx="589680" cy="546120"/>
           </a:xfrm>
           <a:prstGeom prst="rect">
             <a:avLst/>
@@ -7318,7 +7210,7 @@
         <p:spPr>
           <a:xfrm>
             <a:off x="7904160" y="1091520"/>
-            <a:ext cx="1007640" cy="333000"/>
+            <a:ext cx="1006920" cy="333000"/>
           </a:xfrm>
           <a:prstGeom prst="rect">
             <a:avLst/>
@@ -7339,7 +7231,7 @@
             <a:spAutoFit/>
           </a:bodyPr>
           <a:p>
-            <a:pPr marL="84960" indent="-82440">
+            <a:pPr marL="84960" indent="-81720">
               <a:lnSpc>
                 <a:spcPct val="100000"/>
               </a:lnSpc>
@@ -7402,7 +7294,7 @@
         <p:spPr>
           <a:xfrm>
             <a:off x="4401720" y="4914720"/>
-            <a:ext cx="1464120" cy="333000"/>
+            <a:ext cx="1463400" cy="333000"/>
           </a:xfrm>
           <a:prstGeom prst="rect">
             <a:avLst/>
@@ -7464,7 +7356,7 @@
         <p:spPr>
           <a:xfrm>
             <a:off x="5163120" y="4054680"/>
-            <a:ext cx="2494440" cy="13680"/>
+            <a:ext cx="2493720" cy="12960"/>
           </a:xfrm>
           <a:custGeom>
             <a:avLst/>
@@ -7507,8 +7399,8 @@
         </p:nvSpPr>
         <p:spPr>
           <a:xfrm flipH="1" flipV="1">
-            <a:off x="5160960" y="4284720"/>
-            <a:ext cx="2470320" cy="5400"/>
+            <a:off x="5160240" y="4284000"/>
+            <a:ext cx="2469600" cy="4680"/>
           </a:xfrm>
           <a:custGeom>
             <a:avLst/>
@@ -7552,7 +7444,7 @@
         <p:spPr>
           <a:xfrm>
             <a:off x="5131080" y="4560120"/>
-            <a:ext cx="2494440" cy="13680"/>
+            <a:ext cx="2493720" cy="12960"/>
           </a:xfrm>
           <a:custGeom>
             <a:avLst/>
@@ -7595,8 +7487,8 @@
         </p:nvSpPr>
         <p:spPr>
           <a:xfrm flipH="1" flipV="1">
-            <a:off x="5153040" y="4765680"/>
-            <a:ext cx="2470320" cy="5400"/>
+            <a:off x="5152320" y="4764960"/>
+            <a:ext cx="2469600" cy="4680"/>
           </a:xfrm>
           <a:custGeom>
             <a:avLst/>
@@ -7640,7 +7532,7 @@
         <p:spPr>
           <a:xfrm>
             <a:off x="960480" y="190800"/>
-            <a:ext cx="9861480" cy="573480"/>
+            <a:ext cx="9860760" cy="572760"/>
           </a:xfrm>
           <a:prstGeom prst="rect">
             <a:avLst/>
@@ -7665,8 +7557,8 @@
         </p:nvSpPr>
         <p:spPr>
           <a:xfrm flipV="1">
-            <a:off x="5130720" y="3673800"/>
-            <a:ext cx="5835600" cy="15480"/>
+            <a:off x="5130720" y="3672360"/>
+            <a:ext cx="5834880" cy="14760"/>
           </a:xfrm>
           <a:custGeom>
             <a:avLst/>
@@ -7760,7 +7652,7 @@
         <p:spPr>
           <a:xfrm>
             <a:off x="1198440" y="41400"/>
-            <a:ext cx="10513080" cy="1038600"/>
+            <a:ext cx="10512360" cy="1037880"/>
           </a:xfrm>
           <a:prstGeom prst="rect">
             <a:avLst/>
@@ -7811,7 +7703,7 @@
         <p:spPr>
           <a:xfrm>
             <a:off x="540000" y="3780000"/>
-            <a:ext cx="8099640" cy="2375640"/>
+            <a:ext cx="8098920" cy="2374920"/>
           </a:xfrm>
           <a:custGeom>
             <a:avLst/>
@@ -7941,7 +7833,7 @@
         <p:spPr>
           <a:xfrm>
             <a:off x="5131080" y="5252040"/>
-            <a:ext cx="2494440" cy="13680"/>
+            <a:ext cx="2493720" cy="12960"/>
           </a:xfrm>
           <a:custGeom>
             <a:avLst/>
@@ -7984,8 +7876,8 @@
         </p:nvSpPr>
         <p:spPr>
           <a:xfrm flipH="1" flipV="1">
-            <a:off x="5153040" y="5518440"/>
-            <a:ext cx="2470320" cy="5400"/>
+            <a:off x="5152320" y="5517720"/>
+            <a:ext cx="2469600" cy="4680"/>
           </a:xfrm>
           <a:custGeom>
             <a:avLst/>
@@ -8029,7 +7921,7 @@
         <p:spPr>
           <a:xfrm>
             <a:off x="7651800" y="5279400"/>
-            <a:ext cx="1603800" cy="360"/>
+            <a:ext cx="1603080" cy="360"/>
           </a:xfrm>
           <a:custGeom>
             <a:avLst/>
@@ -8072,8 +7964,8 @@
         </p:nvSpPr>
         <p:spPr>
           <a:xfrm flipH="1" flipV="1">
-            <a:off x="7673400" y="5520600"/>
-            <a:ext cx="1581840" cy="360"/>
+            <a:off x="7672680" y="5519160"/>
+            <a:ext cx="1581120" cy="360"/>
           </a:xfrm>
           <a:custGeom>
             <a:avLst/>
@@ -8117,7 +8009,7 @@
         <p:spPr>
           <a:xfrm>
             <a:off x="7651800" y="5819760"/>
-            <a:ext cx="1603800" cy="360"/>
+            <a:ext cx="1603080" cy="360"/>
           </a:xfrm>
           <a:custGeom>
             <a:avLst/>
@@ -8160,8 +8052,8 @@
         </p:nvSpPr>
         <p:spPr>
           <a:xfrm flipH="1" flipV="1">
-            <a:off x="7673760" y="6060600"/>
-            <a:ext cx="1581840" cy="360"/>
+            <a:off x="7673040" y="6059160"/>
+            <a:ext cx="1581120" cy="360"/>
           </a:xfrm>
           <a:custGeom>
             <a:avLst/>
@@ -8205,7 +8097,7 @@
         <p:spPr>
           <a:xfrm>
             <a:off x="5131080" y="5796000"/>
-            <a:ext cx="2494440" cy="13680"/>
+            <a:ext cx="2493720" cy="12960"/>
           </a:xfrm>
           <a:custGeom>
             <a:avLst/>
@@ -8248,8 +8140,8 @@
         </p:nvSpPr>
         <p:spPr>
           <a:xfrm flipH="1" flipV="1">
-            <a:off x="5153040" y="6062400"/>
-            <a:ext cx="2470320" cy="5400"/>
+            <a:off x="5152320" y="6061680"/>
+            <a:ext cx="2469600" cy="4680"/>
           </a:xfrm>
           <a:custGeom>
             <a:avLst/>
@@ -8293,7 +8185,7 @@
         <p:spPr>
           <a:xfrm>
             <a:off x="2385360" y="5782320"/>
-            <a:ext cx="2722680" cy="360"/>
+            <a:ext cx="2721960" cy="360"/>
           </a:xfrm>
           <a:custGeom>
             <a:avLst/>
@@ -8335,8 +8227,8 @@
         </p:nvSpPr>
         <p:spPr>
           <a:xfrm flipH="1">
-            <a:off x="2381400" y="6086160"/>
-            <a:ext cx="2724480" cy="360"/>
+            <a:off x="2380680" y="6086160"/>
+            <a:ext cx="2723760" cy="360"/>
           </a:xfrm>
           <a:custGeom>
             <a:avLst/>
@@ -8379,7 +8271,7 @@
         <p:spPr>
           <a:xfrm>
             <a:off x="2402280" y="5592960"/>
-            <a:ext cx="2561040" cy="211320"/>
+            <a:ext cx="2560320" cy="211320"/>
           </a:xfrm>
           <a:prstGeom prst="rect">
             <a:avLst/>
@@ -8430,7 +8322,7 @@
         <p:spPr>
           <a:xfrm>
             <a:off x="2402280" y="5844960"/>
-            <a:ext cx="2561040" cy="211680"/>
+            <a:ext cx="2560320" cy="211320"/>
           </a:xfrm>
           <a:prstGeom prst="rect">
             <a:avLst/>
@@ -8511,7 +8403,7 @@
         <p:spPr>
           <a:xfrm>
             <a:off x="838080" y="365040"/>
-            <a:ext cx="10513080" cy="1323000"/>
+            <a:ext cx="10512360" cy="1074600"/>
           </a:xfrm>
           <a:prstGeom prst="rect">
             <a:avLst/>
@@ -8561,8 +8453,8 @@
         </p:nvSpPr>
         <p:spPr>
           <a:xfrm>
-            <a:off x="838080" y="1825560"/>
-            <a:ext cx="10681920" cy="4664880"/>
+            <a:off x="838080" y="1393560"/>
+            <a:ext cx="10681200" cy="4664160"/>
           </a:xfrm>
           <a:prstGeom prst="rect">
             <a:avLst/>
@@ -8596,7 +8488,7 @@
                 <a:latin typeface="Calibri"/>
                 <a:ea typeface="DejaVu Sans"/>
               </a:rPr>
-              <a:t>Due to internal review, WG review, and document shepherd review,</a:t>
+              <a:t>Mostly in response to internal review, WG review, and document shepherd review.</a:t>
             </a:r>
             <a:br/>
             <a:r>
@@ -8607,17 +8499,22 @@
                 <a:latin typeface="Calibri"/>
                 <a:ea typeface="DejaVu Sans"/>
               </a:rPr>
-              <a:t>many editorial improvements and clarifications, such as better comparison to plain BRSKI,</a:t>
+              <a:t>Many editorial improvements, e.g., on</a:t>
             </a:r>
             <a:endParaRPr b="0" lang="en-US" sz="2000" spc="-1" strike="noStrike">
               <a:latin typeface="Arial"/>
             </a:endParaRPr>
           </a:p>
           <a:p>
-            <a:pPr>
+            <a:pPr marL="228600" indent="-225360">
               <a:lnSpc>
                 <a:spcPct val="100000"/>
               </a:lnSpc>
+              <a:buClr>
+                <a:srgbClr val="000000"/>
+              </a:buClr>
+              <a:buFont typeface="Arial"/>
+              <a:buChar char="•"/>
             </a:pPr>
             <a:r>
               <a:rPr b="0" lang="en-US" sz="2000" spc="-1" strike="noStrike">
@@ -8627,8 +8524,23 @@
                 <a:latin typeface="Calibri"/>
                 <a:ea typeface="DejaVu Sans"/>
               </a:rPr>
-              <a:t>better </a:t>
-            </a:r>
+              <a:t>comparison of BRSKI-AE to plain BRSKI</a:t>
+            </a:r>
+            <a:endParaRPr b="0" lang="en-US" sz="2000" spc="-1" strike="noStrike">
+              <a:latin typeface="Arial"/>
+            </a:endParaRPr>
+          </a:p>
+          <a:p>
+            <a:pPr marL="228600" indent="-225360">
+              <a:lnSpc>
+                <a:spcPct val="100000"/>
+              </a:lnSpc>
+              <a:buClr>
+                <a:srgbClr val="000000"/>
+              </a:buClr>
+              <a:buFont typeface="Arial"/>
+              <a:buChar char="•"/>
+            </a:pPr>
             <a:r>
               <a:rPr b="0" lang="en-US" sz="2000" spc="-1" strike="noStrike">
                 <a:solidFill>
@@ -8637,7 +8549,32 @@
                 <a:latin typeface="Calibri"/>
                 <a:ea typeface="DejaVu Sans"/>
               </a:rPr>
-              <a:t>differentiation of RA flavors and description of offline vs. synchronous msg transfer.</a:t>
+              <a:t>differentiation of RA flavors (local RA vs. PKI RA in backend)</a:t>
+            </a:r>
+            <a:endParaRPr b="0" lang="en-US" sz="2000" spc="-1" strike="noStrike">
+              <a:latin typeface="Arial"/>
+            </a:endParaRPr>
+          </a:p>
+          <a:p>
+            <a:pPr marL="228600" indent="-225360">
+              <a:lnSpc>
+                <a:spcPct val="100000"/>
+              </a:lnSpc>
+              <a:buClr>
+                <a:srgbClr val="000000"/>
+              </a:buClr>
+              <a:buFont typeface="Arial"/>
+              <a:buChar char="•"/>
+            </a:pPr>
+            <a:r>
+              <a:rPr b="0" lang="en-US" sz="2000" spc="-1" strike="noStrike">
+                <a:solidFill>
+                  <a:srgbClr val="000000"/>
+                </a:solidFill>
+                <a:latin typeface="Calibri"/>
+                <a:ea typeface="DejaVu Sans"/>
+              </a:rPr>
+              <a:t>description of offline vs. synchronous msg transfer</a:t>
             </a:r>
             <a:endParaRPr b="0" lang="en-US" sz="2000" spc="-1" strike="noStrike">
               <a:latin typeface="Arial"/>
@@ -8663,14 +8600,14 @@
                 <a:latin typeface="Calibri"/>
                 <a:ea typeface="DejaVu Sans"/>
               </a:rPr>
-              <a:t>Clarifications:</a:t>
+              <a:t>Clarifications on requirements:</a:t>
             </a:r>
             <a:endParaRPr b="0" lang="en-US" sz="2000" spc="-1" strike="noStrike">
               <a:latin typeface="Arial"/>
             </a:endParaRPr>
           </a:p>
           <a:p>
-            <a:pPr marL="228600" indent="-226080">
+            <a:pPr marL="228600" indent="-225360">
               <a:lnSpc>
                 <a:spcPct val="100000"/>
               </a:lnSpc>
@@ -8712,7 +8649,7 @@
             </a:endParaRPr>
           </a:p>
           <a:p>
-            <a:pPr marL="228600" indent="-226080">
+            <a:pPr marL="228600" indent="-225360">
               <a:lnSpc>
                 <a:spcPct val="100000"/>
               </a:lnSpc>
@@ -8736,7 +8673,7 @@
                 <a:latin typeface="Calibri"/>
                 <a:ea typeface="DejaVu Sans"/>
               </a:rPr>
-              <a:t>For cert enrollment msgs between pledge and registrar the established TLS channel is used, </a:t>
+              <a:t>For cert enrollment, messages between pledge and registrar the established TLS channel is used, </a:t>
             </a:r>
             <a:br/>
             <a:r>
@@ -8747,14 +8684,14 @@
                 <a:latin typeface="Calibri"/>
                 <a:ea typeface="DejaVu Sans"/>
               </a:rPr>
-              <a:t>which must be supported by the enrollment protocol. </a:t>
+              <a:t>which MUST be supported by the enrollment protocol. </a:t>
             </a:r>
             <a:endParaRPr b="0" lang="en-US" sz="2000" spc="-1" strike="noStrike">
               <a:latin typeface="Arial"/>
             </a:endParaRPr>
           </a:p>
           <a:p>
-            <a:pPr marL="228600" indent="-226080">
+            <a:pPr marL="228600" indent="-225360">
               <a:lnSpc>
                 <a:spcPct val="100000"/>
               </a:lnSpc>
@@ -8778,7 +8715,7 @@
                 <a:latin typeface="Calibri"/>
                 <a:ea typeface="DejaVu Sans"/>
               </a:rPr>
-              <a:t>The cert enrollment protocol used between pledge and registrar </a:t>
+              <a:t>The cert enrollment protocol used between pledge and registrar MUST also be used </a:t>
             </a:r>
             <a:br/>
             <a:r>
@@ -8789,14 +8726,14 @@
                 <a:latin typeface="Calibri"/>
                 <a:ea typeface="DejaVu Sans"/>
               </a:rPr>
-              <a:t>MUST also be used for the upstream enrollment exchange with the PKI.</a:t>
+              <a:t>for the upstream enrollment exchange with the PKI to retain the end-to-end POI/POP.</a:t>
             </a:r>
             <a:endParaRPr b="0" lang="en-US" sz="2000" spc="-1" strike="noStrike">
               <a:latin typeface="Arial"/>
             </a:endParaRPr>
           </a:p>
           <a:p>
-            <a:pPr marL="228600" indent="-226080">
+            <a:pPr marL="228600" indent="-225360">
               <a:lnSpc>
                 <a:spcPct val="100000"/>
               </a:lnSpc>
@@ -8820,7 +8757,7 @@
                 <a:latin typeface="Calibri"/>
                 <a:ea typeface="DejaVu Sans"/>
               </a:rPr>
-              <a:t>During the certificate enrollment phase the registrar MAY handle requests by the pledge itself, otherwise MUST forward them to the PKI and forward responses to the pledge.</a:t>
+              <a:t>During the cert enrollment phase, the registrar MAY handle requests by the pledge itself (as a local RA), otherwise MUST forward them to the responsible PKI and forward responses to the pledge.</a:t>
             </a:r>
             <a:endParaRPr b="0" lang="en-US" sz="2000" spc="-1" strike="noStrike">
               <a:latin typeface="Arial"/>
@@ -8866,7 +8803,7 @@
                 <a:latin typeface="Calibri"/>
                 <a:ea typeface="DejaVu Sans"/>
               </a:rPr>
-              <a:t> contributor</a:t>
+              <a:t> contributor.</a:t>
             </a:r>
             <a:endParaRPr b="0" lang="en-US" sz="2000" spc="-1" strike="noStrike">
               <a:latin typeface="Arial"/>
@@ -8884,6 +8821,16 @@
                 <a:spcPts val="283"/>
               </a:spcAft>
             </a:pPr>
+            <a:r>
+              <a:rPr b="0" lang="en-US" sz="2000" spc="-1" strike="noStrike">
+                <a:solidFill>
+                  <a:srgbClr val="000000"/>
+                </a:solidFill>
+                <a:latin typeface="Arial"/>
+                <a:ea typeface="DejaVu Sans"/>
+              </a:rPr>
+              <a:t>.</a:t>
+            </a:r>
             <a:endParaRPr b="0" lang="en-US" sz="2000" spc="-1" strike="noStrike">
               <a:latin typeface="Arial"/>
             </a:endParaRPr>
@@ -8961,7 +8908,7 @@
         <p:spPr>
           <a:xfrm>
             <a:off x="990720" y="1558080"/>
-            <a:ext cx="10707120" cy="5128200"/>
+            <a:ext cx="10706400" cy="5127480"/>
           </a:xfrm>
           <a:prstGeom prst="rect">
             <a:avLst/>
@@ -8982,7 +8929,7 @@
             <a:noAutofit/>
           </a:bodyPr>
           <a:p>
-            <a:pPr marL="228600" indent="-226080">
+            <a:pPr marL="228600" indent="-225360">
               <a:lnSpc>
                 <a:spcPct val="100000"/>
               </a:lnSpc>
@@ -9023,141 +8970,7 @@
             </a:endParaRPr>
           </a:p>
           <a:p>
-            <a:pPr marL="228600" indent="-226080">
-              <a:lnSpc>
-                <a:spcPct val="100000"/>
-              </a:lnSpc>
-              <a:spcBef>
-                <a:spcPts val="601"/>
-              </a:spcBef>
-              <a:buClr>
-                <a:srgbClr val="000000"/>
-              </a:buClr>
-              <a:buFont typeface="Arial"/>
-              <a:buChar char="•"/>
-            </a:pPr>
-            <a:r>
-              <a:rPr b="0" lang="en-US" sz="2400" spc="-1" strike="noStrike">
-                <a:solidFill>
-                  <a:srgbClr val="000000"/>
-                </a:solidFill>
-                <a:latin typeface="Calibri"/>
-                <a:ea typeface="DejaVu Sans"/>
-              </a:rPr>
-              <a:t>Decision on removal of details on applying EST-fullCMC</a:t>
-            </a:r>
-            <a:r>
-              <a:rPr b="0" lang="en-US" sz="2400" spc="-1" strike="noStrike">
-                <a:solidFill>
-                  <a:srgbClr val="000000"/>
-                </a:solidFill>
-                <a:latin typeface="Calibri"/>
-                <a:ea typeface="DejaVu Sans"/>
-              </a:rPr>
-              <a:t> </a:t>
-            </a:r>
-            <a:r>
-              <a:rPr b="0" lang="en-US" sz="2400" spc="-1" strike="noStrike">
-                <a:solidFill>
-                  <a:srgbClr val="000000"/>
-                </a:solidFill>
-                <a:latin typeface="OpenSymbol"/>
-                <a:ea typeface="OpenSymbol"/>
-              </a:rPr>
-              <a:t>✓</a:t>
-            </a:r>
-            <a:endParaRPr b="0" lang="en-US" sz="2400" spc="-1" strike="noStrike">
-              <a:latin typeface="Arial"/>
-            </a:endParaRPr>
-          </a:p>
-          <a:p>
-            <a:pPr marL="228600" indent="-226080">
-              <a:lnSpc>
-                <a:spcPct val="100000"/>
-              </a:lnSpc>
-              <a:spcBef>
-                <a:spcPts val="601"/>
-              </a:spcBef>
-              <a:buClr>
-                <a:srgbClr val="000000"/>
-              </a:buClr>
-              <a:buFont typeface="Arial"/>
-              <a:buChar char="•"/>
-            </a:pPr>
-            <a:r>
-              <a:rPr b="0" lang="en-US" sz="2400" spc="-1" strike="noStrike">
-                <a:solidFill>
-                  <a:srgbClr val="000000"/>
-                </a:solidFill>
-                <a:latin typeface="Calibri"/>
-                <a:ea typeface="DejaVu Sans"/>
-              </a:rPr>
-              <a:t>WG review done by Michael Richardson </a:t>
-            </a:r>
-            <a:r>
-              <a:rPr b="0" lang="en-US" sz="2400" spc="-1" strike="noStrike">
-                <a:solidFill>
-                  <a:srgbClr val="000000"/>
-                </a:solidFill>
-                <a:latin typeface="OpenSymbol"/>
-                <a:ea typeface="OpenSymbol"/>
-              </a:rPr>
-              <a:t>✓</a:t>
-            </a:r>
-            <a:endParaRPr b="0" lang="en-US" sz="2400" spc="-1" strike="noStrike">
-              <a:latin typeface="Arial"/>
-            </a:endParaRPr>
-          </a:p>
-          <a:p>
-            <a:pPr marL="228600" indent="-226080">
-              <a:lnSpc>
-                <a:spcPct val="100000"/>
-              </a:lnSpc>
-              <a:spcBef>
-                <a:spcPts val="1001"/>
-              </a:spcBef>
-              <a:buClr>
-                <a:srgbClr val="000000"/>
-              </a:buClr>
-              <a:buFont typeface="Arial"/>
-              <a:buChar char="•"/>
-            </a:pPr>
-            <a:r>
-              <a:rPr b="0" lang="en-US" sz="2400" spc="-1" strike="noStrike">
-                <a:solidFill>
-                  <a:srgbClr val="000000"/>
-                </a:solidFill>
-                <a:latin typeface="Calibri"/>
-                <a:ea typeface="DejaVu Sans"/>
-              </a:rPr>
-              <a:t>Document shepherd review done by Toerless Eckert </a:t>
-            </a:r>
-            <a:r>
-              <a:rPr b="0" lang="en-US" sz="2400" spc="-1" strike="noStrike">
-                <a:solidFill>
-                  <a:srgbClr val="000000"/>
-                </a:solidFill>
-                <a:latin typeface="OpenSymbol"/>
-                <a:ea typeface="OpenSymbol"/>
-              </a:rPr>
-              <a:t>✓</a:t>
-            </a:r>
-            <a:r>
-              <a:rPr b="0" lang="en-US" sz="2400" spc="-1" strike="noStrike">
-                <a:solidFill>
-                  <a:srgbClr val="000000"/>
-                </a:solidFill>
-                <a:latin typeface="Calibri"/>
-                <a:ea typeface="DejaVu Sans"/>
-              </a:rPr>
-              <a:t> </a:t>
-            </a:r>
-            <a:endParaRPr b="0" lang="en-US" sz="2400" spc="-1" strike="noStrike">
-              <a:latin typeface="Arial"/>
-            </a:endParaRPr>
-          </a:p>
-          <a:p>
-            <a:pPr marL="228600" indent="-226080">
+            <a:pPr marL="228600" indent="-225360">
               <a:lnSpc>
                 <a:spcPct val="100000"/>
               </a:lnSpc>
@@ -9181,6 +8994,139 @@
                 <a:latin typeface="Calibri"/>
                 <a:ea typeface="DejaVu Sans"/>
               </a:rPr>
+              <a:t>Decision on removal of details on applying EST-fullCMC </a:t>
+            </a:r>
+            <a:r>
+              <a:rPr b="0" lang="en-US" sz="2400" spc="-1" strike="noStrike">
+                <a:solidFill>
+                  <a:srgbClr val="000000"/>
+                </a:solidFill>
+                <a:latin typeface="OpenSymbol"/>
+                <a:ea typeface="OpenSymbol"/>
+              </a:rPr>
+              <a:t>✓</a:t>
+            </a:r>
+            <a:endParaRPr b="0" lang="en-US" sz="2400" spc="-1" strike="noStrike">
+              <a:latin typeface="Arial"/>
+            </a:endParaRPr>
+          </a:p>
+          <a:p>
+            <a:pPr marL="228600" indent="-225360">
+              <a:lnSpc>
+                <a:spcPct val="100000"/>
+              </a:lnSpc>
+              <a:spcBef>
+                <a:spcPts val="601"/>
+              </a:spcBef>
+              <a:buClr>
+                <a:srgbClr val="000000"/>
+              </a:buClr>
+              <a:buFont typeface="Arial"/>
+              <a:buChar char="•"/>
+              <a:tabLst>
+                <a:tab algn="l" pos="408240"/>
+              </a:tabLst>
+            </a:pPr>
+            <a:r>
+              <a:rPr b="0" lang="en-US" sz="2400" spc="-1" strike="noStrike">
+                <a:solidFill>
+                  <a:srgbClr val="000000"/>
+                </a:solidFill>
+                <a:latin typeface="Calibri"/>
+                <a:ea typeface="DejaVu Sans"/>
+              </a:rPr>
+              <a:t>WG review done by Michael Richardson </a:t>
+            </a:r>
+            <a:r>
+              <a:rPr b="0" lang="en-US" sz="2400" spc="-1" strike="noStrike">
+                <a:solidFill>
+                  <a:srgbClr val="000000"/>
+                </a:solidFill>
+                <a:latin typeface="OpenSymbol"/>
+                <a:ea typeface="OpenSymbol"/>
+              </a:rPr>
+              <a:t>✓</a:t>
+            </a:r>
+            <a:endParaRPr b="0" lang="en-US" sz="2400" spc="-1" strike="noStrike">
+              <a:latin typeface="Arial"/>
+            </a:endParaRPr>
+          </a:p>
+          <a:p>
+            <a:pPr marL="228600" indent="-225360">
+              <a:lnSpc>
+                <a:spcPct val="100000"/>
+              </a:lnSpc>
+              <a:spcBef>
+                <a:spcPts val="1001"/>
+              </a:spcBef>
+              <a:buClr>
+                <a:srgbClr val="000000"/>
+              </a:buClr>
+              <a:buFont typeface="Arial"/>
+              <a:buChar char="•"/>
+              <a:tabLst>
+                <a:tab algn="l" pos="408240"/>
+              </a:tabLst>
+            </a:pPr>
+            <a:r>
+              <a:rPr b="0" lang="en-US" sz="2400" spc="-1" strike="noStrike">
+                <a:solidFill>
+                  <a:srgbClr val="000000"/>
+                </a:solidFill>
+                <a:latin typeface="Calibri"/>
+                <a:ea typeface="DejaVu Sans"/>
+              </a:rPr>
+              <a:t>Document shepherd review done by Toerless Eckert </a:t>
+            </a:r>
+            <a:r>
+              <a:rPr b="0" lang="en-US" sz="2400" spc="-1" strike="noStrike">
+                <a:solidFill>
+                  <a:srgbClr val="000000"/>
+                </a:solidFill>
+                <a:latin typeface="OpenSymbol"/>
+                <a:ea typeface="OpenSymbol"/>
+              </a:rPr>
+              <a:t>✓</a:t>
+            </a:r>
+            <a:r>
+              <a:rPr b="0" lang="en-US" sz="2400" spc="-1" strike="noStrike">
+                <a:solidFill>
+                  <a:srgbClr val="000000"/>
+                </a:solidFill>
+                <a:latin typeface="Calibri"/>
+                <a:ea typeface="DejaVu Sans"/>
+              </a:rPr>
+              <a:t> </a:t>
+            </a:r>
+            <a:endParaRPr b="0" lang="en-US" sz="2400" spc="-1" strike="noStrike">
+              <a:latin typeface="Arial"/>
+            </a:endParaRPr>
+          </a:p>
+          <a:p>
+            <a:pPr marL="228600" indent="-225360">
+              <a:lnSpc>
+                <a:spcPct val="100000"/>
+              </a:lnSpc>
+              <a:spcBef>
+                <a:spcPts val="601"/>
+              </a:spcBef>
+              <a:buClr>
+                <a:srgbClr val="000000"/>
+              </a:buClr>
+              <a:buFont typeface="Arial"/>
+              <a:buChar char="•"/>
+              <a:tabLst>
+                <a:tab algn="l" pos="408240"/>
+              </a:tabLst>
+            </a:pPr>
+            <a:r>
+              <a:rPr b="0" lang="en-US" sz="2400" spc="-1" strike="noStrike">
+                <a:solidFill>
+                  <a:srgbClr val="000000"/>
+                </a:solidFill>
+                <a:latin typeface="Calibri"/>
+                <a:ea typeface="DejaVu Sans"/>
+              </a:rPr>
               <a:t>Ready for WGLC – ok?</a:t>
             </a:r>
             <a:endParaRPr b="0" lang="en-US" sz="2400" spc="-1" strike="noStrike">
@@ -9230,7 +9176,7 @@
         <p:spPr>
           <a:xfrm>
             <a:off x="838080" y="365040"/>
-            <a:ext cx="10513080" cy="1323000"/>
+            <a:ext cx="10512360" cy="1322280"/>
           </a:xfrm>
           <a:prstGeom prst="rect">
             <a:avLst/>

</xml_diff>